<commit_message>
added background to slides added images to repo and slides
</commit_message>
<xml_diff>
--- a/workshops/2019_10_09/Präsentation 08_10_2019.pptx
+++ b/workshops/2019_10_09/Präsentation 08_10_2019.pptx
@@ -10,11 +10,10 @@
     <p:sldId id="263" r:id="rId4"/>
     <p:sldId id="258" r:id="rId5"/>
     <p:sldId id="259" r:id="rId6"/>
-    <p:sldId id="264" r:id="rId7"/>
-    <p:sldId id="265" r:id="rId8"/>
-    <p:sldId id="260" r:id="rId9"/>
-    <p:sldId id="261" r:id="rId10"/>
-    <p:sldId id="267" r:id="rId11"/>
+    <p:sldId id="265" r:id="rId7"/>
+    <p:sldId id="260" r:id="rId8"/>
+    <p:sldId id="261" r:id="rId9"/>
+    <p:sldId id="267" r:id="rId10"/>
   </p:sldIdLst>
   <p:sldSz cx="12192000" cy="6858000"/>
   <p:notesSz cx="6858000" cy="9144000"/>
@@ -322,7 +321,7 @@
           <a:p>
             <a:fld id="{A312F13E-1E93-4F6D-B514-E99E3F42818D}" type="slidenum">
               <a:rPr lang="de-DE" smtClean="0"/>
-              <a:t>‹Nr.›</a:t>
+              <a:t>‹#›</a:t>
             </a:fld>
             <a:endParaRPr lang="de-DE"/>
           </a:p>
@@ -520,7 +519,7 @@
           <a:p>
             <a:fld id="{A312F13E-1E93-4F6D-B514-E99E3F42818D}" type="slidenum">
               <a:rPr lang="de-DE" smtClean="0"/>
-              <a:t>‹Nr.›</a:t>
+              <a:t>‹#›</a:t>
             </a:fld>
             <a:endParaRPr lang="de-DE"/>
           </a:p>
@@ -728,7 +727,7 @@
           <a:p>
             <a:fld id="{A312F13E-1E93-4F6D-B514-E99E3F42818D}" type="slidenum">
               <a:rPr lang="de-DE" smtClean="0"/>
-              <a:t>‹Nr.›</a:t>
+              <a:t>‹#›</a:t>
             </a:fld>
             <a:endParaRPr lang="de-DE"/>
           </a:p>
@@ -926,7 +925,7 @@
           <a:p>
             <a:fld id="{A312F13E-1E93-4F6D-B514-E99E3F42818D}" type="slidenum">
               <a:rPr lang="de-DE" smtClean="0"/>
-              <a:t>‹Nr.›</a:t>
+              <a:t>‹#›</a:t>
             </a:fld>
             <a:endParaRPr lang="de-DE"/>
           </a:p>
@@ -1201,7 +1200,7 @@
           <a:p>
             <a:fld id="{A312F13E-1E93-4F6D-B514-E99E3F42818D}" type="slidenum">
               <a:rPr lang="de-DE" smtClean="0"/>
-              <a:t>‹Nr.›</a:t>
+              <a:t>‹#›</a:t>
             </a:fld>
             <a:endParaRPr lang="de-DE"/>
           </a:p>
@@ -1466,7 +1465,7 @@
           <a:p>
             <a:fld id="{A312F13E-1E93-4F6D-B514-E99E3F42818D}" type="slidenum">
               <a:rPr lang="de-DE" smtClean="0"/>
-              <a:t>‹Nr.›</a:t>
+              <a:t>‹#›</a:t>
             </a:fld>
             <a:endParaRPr lang="de-DE"/>
           </a:p>
@@ -1878,7 +1877,7 @@
           <a:p>
             <a:fld id="{A312F13E-1E93-4F6D-B514-E99E3F42818D}" type="slidenum">
               <a:rPr lang="de-DE" smtClean="0"/>
-              <a:t>‹Nr.›</a:t>
+              <a:t>‹#›</a:t>
             </a:fld>
             <a:endParaRPr lang="de-DE"/>
           </a:p>
@@ -2019,7 +2018,7 @@
           <a:p>
             <a:fld id="{A312F13E-1E93-4F6D-B514-E99E3F42818D}" type="slidenum">
               <a:rPr lang="de-DE" smtClean="0"/>
-              <a:t>‹Nr.›</a:t>
+              <a:t>‹#›</a:t>
             </a:fld>
             <a:endParaRPr lang="de-DE"/>
           </a:p>
@@ -2132,7 +2131,7 @@
           <a:p>
             <a:fld id="{A312F13E-1E93-4F6D-B514-E99E3F42818D}" type="slidenum">
               <a:rPr lang="de-DE" smtClean="0"/>
-              <a:t>‹Nr.›</a:t>
+              <a:t>‹#›</a:t>
             </a:fld>
             <a:endParaRPr lang="de-DE"/>
           </a:p>
@@ -2443,7 +2442,7 @@
           <a:p>
             <a:fld id="{A312F13E-1E93-4F6D-B514-E99E3F42818D}" type="slidenum">
               <a:rPr lang="de-DE" smtClean="0"/>
-              <a:t>‹Nr.›</a:t>
+              <a:t>‹#›</a:t>
             </a:fld>
             <a:endParaRPr lang="de-DE"/>
           </a:p>
@@ -2731,7 +2730,7 @@
           <a:p>
             <a:fld id="{A312F13E-1E93-4F6D-B514-E99E3F42818D}" type="slidenum">
               <a:rPr lang="de-DE" smtClean="0"/>
-              <a:t>‹Nr.›</a:t>
+              <a:t>‹#›</a:t>
             </a:fld>
             <a:endParaRPr lang="de-DE"/>
           </a:p>
@@ -2754,9 +2753,18 @@
 <p:sldMaster xmlns:a="http://schemas.openxmlformats.org/drawingml/2006/main" xmlns:r="http://schemas.openxmlformats.org/officeDocument/2006/relationships" xmlns:p="http://schemas.openxmlformats.org/presentationml/2006/main">
   <p:cSld>
     <p:bg>
-      <p:bgRef idx="1001">
-        <a:schemeClr val="bg1"/>
-      </p:bgRef>
+      <p:bgPr>
+        <a:blipFill dpi="0" rotWithShape="1">
+          <a:blip r:embed="rId13">
+            <a:lum/>
+          </a:blip>
+          <a:srcRect/>
+          <a:stretch>
+            <a:fillRect t="-17000" b="-17000"/>
+          </a:stretch>
+        </a:blipFill>
+        <a:effectLst/>
+      </p:bgPr>
     </p:bg>
     <p:spTree>
       <p:nvGrpSpPr>
@@ -3008,7 +3016,7 @@
           <a:p>
             <a:fld id="{A312F13E-1E93-4F6D-B514-E99E3F42818D}" type="slidenum">
               <a:rPr lang="de-DE" smtClean="0"/>
-              <a:t>‹Nr.›</a:t>
+              <a:t>‹#›</a:t>
             </a:fld>
             <a:endParaRPr lang="de-DE"/>
           </a:p>
@@ -3404,150 +3412,6 @@
 </p:sld>
 </file>
 
-<file path=ppt/slides/slide10.xml><?xml version="1.0" encoding="utf-8"?>
-<p:sld xmlns:a="http://schemas.openxmlformats.org/drawingml/2006/main" xmlns:r="http://schemas.openxmlformats.org/officeDocument/2006/relationships" xmlns:p="http://schemas.openxmlformats.org/presentationml/2006/main">
-  <p:cSld>
-    <p:spTree>
-      <p:nvGrpSpPr>
-        <p:cNvPr id="1" name=""/>
-        <p:cNvGrpSpPr/>
-        <p:nvPr/>
-      </p:nvGrpSpPr>
-      <p:grpSpPr>
-        <a:xfrm>
-          <a:off x="0" y="0"/>
-          <a:ext cx="0" cy="0"/>
-          <a:chOff x="0" y="0"/>
-          <a:chExt cx="0" cy="0"/>
-        </a:xfrm>
-      </p:grpSpPr>
-      <p:sp>
-        <p:nvSpPr>
-          <p:cNvPr id="2" name="Titel 1">
-            <a:extLst>
-              <a:ext uri="{FF2B5EF4-FFF2-40B4-BE49-F238E27FC236}">
-                <a16:creationId xmlns:a16="http://schemas.microsoft.com/office/drawing/2014/main" id="{34A65147-4D6F-4D9E-AA36-D80FC8751F56}"/>
-              </a:ext>
-            </a:extLst>
-          </p:cNvPr>
-          <p:cNvSpPr>
-            <a:spLocks noGrp="1"/>
-          </p:cNvSpPr>
-          <p:nvPr>
-            <p:ph type="title"/>
-          </p:nvPr>
-        </p:nvSpPr>
-        <p:spPr/>
-        <p:txBody>
-          <a:bodyPr/>
-          <a:lstStyle/>
-          <a:p>
-            <a:r>
-              <a:rPr lang="de-DE" dirty="0"/>
-              <a:t>Next </a:t>
-            </a:r>
-            <a:r>
-              <a:rPr lang="de-DE" dirty="0" err="1"/>
-              <a:t>Steps</a:t>
-            </a:r>
-            <a:r>
-              <a:rPr lang="de-DE" dirty="0"/>
-              <a:t> – Allgemein</a:t>
-            </a:r>
-          </a:p>
-        </p:txBody>
-      </p:sp>
-      <p:sp>
-        <p:nvSpPr>
-          <p:cNvPr id="3" name="Inhaltsplatzhalter 2">
-            <a:extLst>
-              <a:ext uri="{FF2B5EF4-FFF2-40B4-BE49-F238E27FC236}">
-                <a16:creationId xmlns:a16="http://schemas.microsoft.com/office/drawing/2014/main" id="{E51FDB7C-7C3C-4DA6-A386-67D58ED5A294}"/>
-              </a:ext>
-            </a:extLst>
-          </p:cNvPr>
-          <p:cNvSpPr>
-            <a:spLocks noGrp="1"/>
-          </p:cNvSpPr>
-          <p:nvPr>
-            <p:ph idx="1"/>
-          </p:nvPr>
-        </p:nvSpPr>
-        <p:spPr/>
-        <p:txBody>
-          <a:bodyPr/>
-          <a:lstStyle/>
-          <a:p>
-            <a:r>
-              <a:rPr lang="de-DE" dirty="0"/>
-              <a:t>Untergrund abklären</a:t>
-            </a:r>
-          </a:p>
-          <a:p>
-            <a:r>
-              <a:rPr lang="de-DE" dirty="0"/>
-              <a:t>Möglichkeiten des </a:t>
-            </a:r>
-            <a:r>
-              <a:rPr lang="de-DE" dirty="0" err="1"/>
-              <a:t>FabLab</a:t>
-            </a:r>
-            <a:r>
-              <a:rPr lang="de-DE" dirty="0"/>
-              <a:t> abklären</a:t>
-            </a:r>
-          </a:p>
-          <a:p>
-            <a:r>
-              <a:rPr lang="de-DE" dirty="0"/>
-              <a:t>Hardwarebestellung durchführen</a:t>
-            </a:r>
-          </a:p>
-          <a:p>
-            <a:r>
-              <a:rPr lang="de-DE" dirty="0"/>
-              <a:t>Sonstige Materialien</a:t>
-            </a:r>
-          </a:p>
-          <a:p>
-            <a:pPr lvl="1"/>
-            <a:r>
-              <a:rPr lang="de-DE" dirty="0" err="1"/>
-              <a:t>Breadboard</a:t>
-            </a:r>
-            <a:r>
-              <a:rPr lang="de-DE" dirty="0"/>
-              <a:t>, </a:t>
-            </a:r>
-            <a:r>
-              <a:rPr lang="de-DE" dirty="0" err="1"/>
-              <a:t>JumperWires</a:t>
-            </a:r>
-            <a:r>
-              <a:rPr lang="de-DE" dirty="0"/>
-              <a:t>, </a:t>
-            </a:r>
-            <a:r>
-              <a:rPr lang="de-DE" dirty="0" err="1"/>
-              <a:t>Resistors</a:t>
-            </a:r>
-            <a:endParaRPr lang="de-DE" dirty="0"/>
-          </a:p>
-        </p:txBody>
-      </p:sp>
-    </p:spTree>
-    <p:extLst>
-      <p:ext uri="{BB962C8B-B14F-4D97-AF65-F5344CB8AC3E}">
-        <p14:creationId xmlns:p14="http://schemas.microsoft.com/office/powerpoint/2010/main" val="2244558388"/>
-      </p:ext>
-    </p:extLst>
-  </p:cSld>
-  <p:clrMapOvr>
-    <a:masterClrMapping/>
-  </p:clrMapOvr>
-</p:sld>
-</file>
-
 <file path=ppt/slides/slide2.xml><?xml version="1.0" encoding="utf-8"?>
 <p:sld xmlns:a="http://schemas.openxmlformats.org/drawingml/2006/main" xmlns:r="http://schemas.openxmlformats.org/officeDocument/2006/relationships" xmlns:p="http://schemas.openxmlformats.org/presentationml/2006/main">
   <p:cSld>
@@ -3616,7 +3480,7 @@
           <a:p>
             <a:r>
               <a:rPr lang="de-DE" dirty="0"/>
-              <a:t>Verdeutlichung der täglichem Emissionen</a:t>
+              <a:t>Verdeutlichung der täglichen Emissionen</a:t>
             </a:r>
           </a:p>
           <a:p>
@@ -3695,6 +3559,20 @@
 <file path=ppt/slides/slide3.xml><?xml version="1.0" encoding="utf-8"?>
 <p:sld xmlns:a="http://schemas.openxmlformats.org/drawingml/2006/main" xmlns:r="http://schemas.openxmlformats.org/officeDocument/2006/relationships" xmlns:p="http://schemas.openxmlformats.org/presentationml/2006/main">
   <p:cSld>
+    <p:bg>
+      <p:bgPr>
+        <a:blipFill dpi="0" rotWithShape="1">
+          <a:blip r:embed="rId2">
+            <a:lum/>
+          </a:blip>
+          <a:srcRect/>
+          <a:stretch>
+            <a:fillRect t="-17000" b="-17000"/>
+          </a:stretch>
+        </a:blipFill>
+        <a:effectLst/>
+      </p:bgPr>
+    </p:bg>
     <p:spTree>
       <p:nvGrpSpPr>
         <p:cNvPr id="1" name=""/>
@@ -3725,18 +3603,64 @@
             <p:ph type="title"/>
           </p:nvPr>
         </p:nvSpPr>
-        <p:spPr/>
-        <p:txBody>
-          <a:bodyPr/>
-          <a:lstStyle/>
-          <a:p>
-            <a:r>
-              <a:rPr lang="de-DE" dirty="0"/>
+        <p:spPr>
+          <a:xfrm>
+            <a:off x="5069940" y="365124"/>
+            <a:ext cx="6172200" cy="1828800"/>
+          </a:xfrm>
+        </p:spPr>
+        <p:txBody>
+          <a:bodyPr>
+            <a:normAutofit/>
+          </a:bodyPr>
+          <a:lstStyle/>
+          <a:p>
+            <a:r>
+              <a:rPr lang="de-DE" dirty="0">
+                <a:solidFill>
+                  <a:schemeClr val="bg1"/>
+                </a:solidFill>
+              </a:rPr>
               <a:t>Projektidee</a:t>
             </a:r>
           </a:p>
         </p:txBody>
       </p:sp>
+      <p:pic>
+        <p:nvPicPr>
+          <p:cNvPr id="5" name="Picture 4">
+            <a:extLst>
+              <a:ext uri="{FF2B5EF4-FFF2-40B4-BE49-F238E27FC236}">
+                <a16:creationId xmlns:a16="http://schemas.microsoft.com/office/drawing/2014/main" id="{9003388F-9B94-4ACB-AA0C-DAD7B39C0024}"/>
+              </a:ext>
+            </a:extLst>
+          </p:cNvPr>
+          <p:cNvPicPr>
+            <a:picLocks noChangeAspect="1"/>
+          </p:cNvPicPr>
+          <p:nvPr/>
+        </p:nvPicPr>
+        <p:blipFill rotWithShape="1">
+          <a:blip r:embed="rId3">
+            <a:extLst>
+              <a:ext uri="{28A0092B-C50C-407E-A947-70E740481C1C}">
+                <a14:useLocalDpi xmlns:a14="http://schemas.microsoft.com/office/drawing/2010/main" val="0"/>
+              </a:ext>
+            </a:extLst>
+          </a:blip>
+          <a:srcRect b="16857"/>
+          <a:stretch/>
+        </p:blipFill>
+        <p:spPr>
+          <a:xfrm>
+            <a:off x="20" y="10"/>
+            <a:ext cx="4639713" cy="6857990"/>
+          </a:xfrm>
+          <a:prstGeom prst="rect">
+            <a:avLst/>
+          </a:prstGeom>
+        </p:spPr>
+      </p:pic>
       <p:sp>
         <p:nvSpPr>
           <p:cNvPr id="3" name="Inhaltsplatzhalter 2">
@@ -3753,41 +3677,68 @@
             <p:ph idx="1"/>
           </p:nvPr>
         </p:nvSpPr>
-        <p:spPr/>
-        <p:txBody>
-          <a:bodyPr/>
-          <a:lstStyle/>
-          <a:p>
-            <a:r>
-              <a:rPr lang="de-DE" dirty="0"/>
+        <p:spPr>
+          <a:xfrm>
+            <a:off x="5069940" y="2322576"/>
+            <a:ext cx="6172200" cy="3858768"/>
+          </a:xfrm>
+        </p:spPr>
+        <p:txBody>
+          <a:bodyPr>
+            <a:normAutofit/>
+          </a:bodyPr>
+          <a:lstStyle/>
+          <a:p>
+            <a:r>
+              <a:rPr lang="de-DE" sz="2400" dirty="0">
+                <a:solidFill>
+                  <a:schemeClr val="bg1"/>
+                </a:solidFill>
+              </a:rPr>
               <a:t>Anforderung</a:t>
             </a:r>
           </a:p>
           <a:p>
             <a:pPr lvl="1"/>
             <a:r>
-              <a:rPr lang="de-DE" dirty="0"/>
+              <a:rPr lang="de-DE" dirty="0">
+                <a:solidFill>
+                  <a:schemeClr val="bg1"/>
+                </a:solidFill>
+              </a:rPr>
               <a:t>Einfache Bedienung</a:t>
             </a:r>
           </a:p>
           <a:p>
             <a:pPr lvl="2"/>
             <a:r>
-              <a:rPr lang="de-DE" dirty="0"/>
+              <a:rPr lang="de-DE" sz="2400" dirty="0">
+                <a:solidFill>
+                  <a:schemeClr val="bg1"/>
+                </a:solidFill>
+              </a:rPr>
               <a:t>Keine Konfiguration durch den Nutzer</a:t>
             </a:r>
           </a:p>
           <a:p>
             <a:pPr lvl="2"/>
             <a:r>
-              <a:rPr lang="de-DE" dirty="0"/>
+              <a:rPr lang="de-DE" sz="2400" dirty="0">
+                <a:solidFill>
+                  <a:schemeClr val="bg1"/>
+                </a:solidFill>
+              </a:rPr>
               <a:t>Plug &amp; Play Erfahrung</a:t>
             </a:r>
           </a:p>
           <a:p>
             <a:pPr lvl="1"/>
             <a:r>
-              <a:rPr lang="de-DE" dirty="0"/>
+              <a:rPr lang="de-DE" dirty="0">
+                <a:solidFill>
+                  <a:schemeClr val="bg1"/>
+                </a:solidFill>
+              </a:rPr>
               <a:t>Einfache Visualisierung der Daten</a:t>
             </a:r>
           </a:p>
@@ -3795,13 +3746,21 @@
             <a:pPr marL="457200" lvl="1" indent="0">
               <a:buNone/>
             </a:pPr>
-            <a:endParaRPr lang="de-DE" dirty="0"/>
+            <a:endParaRPr lang="de-DE" dirty="0">
+              <a:solidFill>
+                <a:schemeClr val="bg1"/>
+              </a:solidFill>
+            </a:endParaRPr>
           </a:p>
           <a:p>
             <a:pPr marL="457200" lvl="1" indent="0">
               <a:buNone/>
             </a:pPr>
-            <a:endParaRPr lang="de-DE" dirty="0"/>
+            <a:endParaRPr lang="de-DE" dirty="0">
+              <a:solidFill>
+                <a:schemeClr val="bg1"/>
+              </a:solidFill>
+            </a:endParaRPr>
           </a:p>
         </p:txBody>
       </p:sp>
@@ -3813,7 +3772,7 @@
     </p:extLst>
   </p:cSld>
   <p:clrMapOvr>
-    <a:masterClrMapping/>
+    <a:overrideClrMapping bg1="dk1" tx1="lt1" bg2="dk2" tx2="lt2" accent1="accent1" accent2="accent2" accent3="accent3" accent4="accent4" accent5="accent5" accent6="accent6" hlink="hlink" folHlink="folHlink"/>
   </p:clrMapOvr>
 </p:sld>
 </file>
@@ -3927,7 +3886,7 @@
           <a:p>
             <a:r>
               <a:rPr lang="de-DE" dirty="0"/>
-              <a:t>1 Optionale Komponente</a:t>
+              <a:t>Eine Optionale Komponente</a:t>
             </a:r>
           </a:p>
           <a:p>
@@ -3953,6 +3912,42 @@
           </a:p>
         </p:txBody>
       </p:sp>
+      <p:pic>
+        <p:nvPicPr>
+          <p:cNvPr id="5" name="Picture 4">
+            <a:extLst>
+              <a:ext uri="{FF2B5EF4-FFF2-40B4-BE49-F238E27FC236}">
+                <a16:creationId xmlns:a16="http://schemas.microsoft.com/office/drawing/2014/main" id="{B6FC1057-9025-400D-A0B3-2579391A9FE5}"/>
+              </a:ext>
+            </a:extLst>
+          </p:cNvPr>
+          <p:cNvPicPr>
+            <a:picLocks noChangeAspect="1"/>
+          </p:cNvPicPr>
+          <p:nvPr/>
+        </p:nvPicPr>
+        <p:blipFill>
+          <a:blip r:embed="rId2">
+            <a:extLst>
+              <a:ext uri="{28A0092B-C50C-407E-A947-70E740481C1C}">
+                <a14:useLocalDpi xmlns:a14="http://schemas.microsoft.com/office/drawing/2010/main" val="0"/>
+              </a:ext>
+            </a:extLst>
+          </a:blip>
+          <a:stretch>
+            <a:fillRect/>
+          </a:stretch>
+        </p:blipFill>
+        <p:spPr>
+          <a:xfrm>
+            <a:off x="8336251" y="0"/>
+            <a:ext cx="3855749" cy="6858000"/>
+          </a:xfrm>
+          <a:prstGeom prst="rect">
+            <a:avLst/>
+          </a:prstGeom>
+        </p:spPr>
+      </p:pic>
     </p:spTree>
     <p:extLst>
       <p:ext uri="{BB962C8B-B14F-4D97-AF65-F5344CB8AC3E}">
@@ -4027,9 +4022,16 @@
             <p:ph idx="1"/>
           </p:nvPr>
         </p:nvSpPr>
-        <p:spPr/>
-        <p:txBody>
-          <a:bodyPr/>
+        <p:spPr>
+          <a:xfrm>
+            <a:off x="838200" y="1825625"/>
+            <a:ext cx="5540022" cy="4351338"/>
+          </a:xfrm>
+        </p:spPr>
+        <p:txBody>
+          <a:bodyPr>
+            <a:normAutofit lnSpcReduction="10000"/>
+          </a:bodyPr>
           <a:lstStyle/>
           <a:p>
             <a:r>
@@ -4098,6 +4100,42 @@
           </a:p>
         </p:txBody>
       </p:sp>
+      <p:pic>
+        <p:nvPicPr>
+          <p:cNvPr id="7" name="Picture 6">
+            <a:extLst>
+              <a:ext uri="{FF2B5EF4-FFF2-40B4-BE49-F238E27FC236}">
+                <a16:creationId xmlns:a16="http://schemas.microsoft.com/office/drawing/2014/main" id="{FF27B302-F921-4DFA-945D-5B2DF5428BC8}"/>
+              </a:ext>
+            </a:extLst>
+          </p:cNvPr>
+          <p:cNvPicPr>
+            <a:picLocks noChangeAspect="1"/>
+          </p:cNvPicPr>
+          <p:nvPr/>
+        </p:nvPicPr>
+        <p:blipFill>
+          <a:blip r:embed="rId2">
+            <a:extLst>
+              <a:ext uri="{28A0092B-C50C-407E-A947-70E740481C1C}">
+                <a14:useLocalDpi xmlns:a14="http://schemas.microsoft.com/office/drawing/2010/main" val="0"/>
+              </a:ext>
+            </a:extLst>
+          </a:blip>
+          <a:stretch>
+            <a:fillRect/>
+          </a:stretch>
+        </p:blipFill>
+        <p:spPr>
+          <a:xfrm>
+            <a:off x="7716470" y="0"/>
+            <a:ext cx="4475530" cy="6858000"/>
+          </a:xfrm>
+          <a:prstGeom prst="rect">
+            <a:avLst/>
+          </a:prstGeom>
+        </p:spPr>
+      </p:pic>
     </p:spTree>
     <p:extLst>
       <p:ext uri="{BB962C8B-B14F-4D97-AF65-F5344CB8AC3E}">
@@ -4133,7 +4171,7 @@
           <p:cNvPr id="2" name="Titel 1">
             <a:extLst>
               <a:ext uri="{FF2B5EF4-FFF2-40B4-BE49-F238E27FC236}">
-                <a16:creationId xmlns:a16="http://schemas.microsoft.com/office/drawing/2014/main" id="{9980B525-A41F-40D0-952B-FDB8ACBFB5E3}"/>
+                <a16:creationId xmlns:a16="http://schemas.microsoft.com/office/drawing/2014/main" id="{901C7854-C13A-452E-A6BF-927DD80E98FE}"/>
               </a:ext>
             </a:extLst>
           </p:cNvPr>
@@ -4144,15 +4182,21 @@
             <p:ph type="title"/>
           </p:nvPr>
         </p:nvSpPr>
-        <p:spPr/>
-        <p:txBody>
-          <a:bodyPr/>
-          <a:lstStyle/>
-          <a:p>
-            <a:r>
-              <a:rPr lang="de-DE" dirty="0"/>
-              <a:t>Hardware</a:t>
-            </a:r>
+        <p:spPr>
+          <a:xfrm>
+            <a:off x="838200" y="365125"/>
+            <a:ext cx="10515600" cy="1325563"/>
+          </a:xfrm>
+        </p:spPr>
+        <p:txBody>
+          <a:bodyPr/>
+          <a:lstStyle/>
+          <a:p>
+            <a:r>
+              <a:rPr lang="de-DE"/>
+              <a:t>Aktueller Stand	</a:t>
+            </a:r>
+            <a:endParaRPr lang="de-DE" dirty="0"/>
           </a:p>
         </p:txBody>
       </p:sp>
@@ -4161,7 +4205,7 @@
           <p:cNvPr id="3" name="Inhaltsplatzhalter 2">
             <a:extLst>
               <a:ext uri="{FF2B5EF4-FFF2-40B4-BE49-F238E27FC236}">
-                <a16:creationId xmlns:a16="http://schemas.microsoft.com/office/drawing/2014/main" id="{1DF7663A-D02F-49D4-B97A-D44C3876118F}"/>
+                <a16:creationId xmlns:a16="http://schemas.microsoft.com/office/drawing/2014/main" id="{BAC03C0F-1531-4601-A425-EC11A29DDF74}"/>
               </a:ext>
             </a:extLst>
           </p:cNvPr>
@@ -4172,10 +4216,35 @@
             <p:ph idx="1"/>
           </p:nvPr>
         </p:nvSpPr>
-        <p:spPr/>
-        <p:txBody>
-          <a:bodyPr/>
-          <a:lstStyle/>
+        <p:spPr>
+          <a:xfrm>
+            <a:off x="838200" y="1825625"/>
+            <a:ext cx="4896556" cy="4351338"/>
+          </a:xfrm>
+        </p:spPr>
+        <p:txBody>
+          <a:bodyPr/>
+          <a:lstStyle/>
+          <a:p>
+            <a:r>
+              <a:rPr lang="de-DE" dirty="0"/>
+              <a:t>Hardware Recherche</a:t>
+            </a:r>
+          </a:p>
+          <a:p>
+            <a:pPr lvl="1"/>
+            <a:r>
+              <a:rPr lang="de-DE" dirty="0"/>
+              <a:t>Auto: Erledigt, benötigt Freigabe</a:t>
+            </a:r>
+          </a:p>
+          <a:p>
+            <a:pPr lvl="1"/>
+            <a:r>
+              <a:rPr lang="de-DE" dirty="0"/>
+              <a:t>Backend: Erledigt, bis auf Ventil</a:t>
+            </a:r>
+          </a:p>
           <a:p>
             <a:r>
               <a:rPr lang="de-DE" dirty="0"/>
@@ -4186,67 +4255,74 @@
             <a:pPr lvl="1"/>
             <a:r>
               <a:rPr lang="de-DE" dirty="0"/>
-              <a:t>Arduino mit integriertem Wifi Modul</a:t>
+              <a:t>Hardware Skizze</a:t>
             </a:r>
           </a:p>
           <a:p>
             <a:pPr lvl="1"/>
             <a:r>
               <a:rPr lang="de-DE" dirty="0"/>
-              <a:t>Batterie zur autarken Energieversorgung</a:t>
-            </a:r>
-          </a:p>
-          <a:p>
-            <a:pPr lvl="1"/>
-            <a:r>
-              <a:rPr lang="de-DE" dirty="0"/>
-              <a:t>Sensor zum Erfassen der gefahrenen Strecke / Geschwindigkeit</a:t>
-            </a:r>
-          </a:p>
-          <a:p>
-            <a:r>
-              <a:rPr lang="de-DE" dirty="0"/>
-              <a:t>Basis Station</a:t>
-            </a:r>
-          </a:p>
-          <a:p>
-            <a:pPr lvl="1"/>
-            <a:r>
-              <a:rPr lang="de-DE" dirty="0"/>
-              <a:t>Raspberry Pi 3B+ mit Wifi Modul</a:t>
-            </a:r>
-          </a:p>
-          <a:p>
-            <a:pPr lvl="1"/>
-            <a:r>
-              <a:rPr lang="de-DE" dirty="0"/>
-              <a:t>Display zur Datenvisualisierung</a:t>
-            </a:r>
-          </a:p>
-          <a:p>
-            <a:pPr lvl="1"/>
-            <a:r>
-              <a:rPr lang="de-DE" dirty="0"/>
-              <a:t>(Optional) Integrierter LEDs</a:t>
-            </a:r>
-          </a:p>
-          <a:p>
-            <a:pPr lvl="1"/>
-            <a:r>
-              <a:rPr lang="de-DE" dirty="0"/>
-              <a:t>(Optional) Luftballon</a:t>
-            </a:r>
-          </a:p>
-          <a:p>
-            <a:pPr lvl="1"/>
+              <a:t>Konzeptskizze mit Maßen</a:t>
+            </a:r>
+          </a:p>
+          <a:p>
+            <a:r>
+              <a:rPr lang="de-DE" dirty="0"/>
+              <a:t>Erste Schritte 3D Modellierung</a:t>
+            </a:r>
+          </a:p>
+          <a:p>
+            <a:pPr marL="0" indent="0">
+              <a:buNone/>
+            </a:pPr>
             <a:endParaRPr lang="de-DE" dirty="0"/>
           </a:p>
-        </p:txBody>
-      </p:sp>
+          <a:p>
+            <a:pPr lvl="2"/>
+            <a:endParaRPr lang="de-DE" dirty="0"/>
+          </a:p>
+        </p:txBody>
+      </p:sp>
+      <p:pic>
+        <p:nvPicPr>
+          <p:cNvPr id="5" name="Picture 4">
+            <a:extLst>
+              <a:ext uri="{FF2B5EF4-FFF2-40B4-BE49-F238E27FC236}">
+                <a16:creationId xmlns:a16="http://schemas.microsoft.com/office/drawing/2014/main" id="{5C6EB75E-A2B9-4322-BCBA-B6179C0E3556}"/>
+              </a:ext>
+            </a:extLst>
+          </p:cNvPr>
+          <p:cNvPicPr>
+            <a:picLocks noChangeAspect="1"/>
+          </p:cNvPicPr>
+          <p:nvPr/>
+        </p:nvPicPr>
+        <p:blipFill>
+          <a:blip r:embed="rId2">
+            <a:extLst>
+              <a:ext uri="{28A0092B-C50C-407E-A947-70E740481C1C}">
+                <a14:useLocalDpi xmlns:a14="http://schemas.microsoft.com/office/drawing/2010/main" val="0"/>
+              </a:ext>
+            </a:extLst>
+          </a:blip>
+          <a:stretch>
+            <a:fillRect/>
+          </a:stretch>
+        </p:blipFill>
+        <p:spPr>
+          <a:xfrm>
+            <a:off x="8336251" y="0"/>
+            <a:ext cx="3855749" cy="6858000"/>
+          </a:xfrm>
+          <a:prstGeom prst="rect">
+            <a:avLst/>
+          </a:prstGeom>
+        </p:spPr>
+      </p:pic>
     </p:spTree>
     <p:extLst>
       <p:ext uri="{BB962C8B-B14F-4D97-AF65-F5344CB8AC3E}">
-        <p14:creationId xmlns:p14="http://schemas.microsoft.com/office/powerpoint/2010/main" val="2725344940"/>
+        <p14:creationId xmlns:p14="http://schemas.microsoft.com/office/powerpoint/2010/main" val="3349344988"/>
       </p:ext>
     </p:extLst>
   </p:cSld>
@@ -4278,7 +4354,7 @@
           <p:cNvPr id="2" name="Titel 1">
             <a:extLst>
               <a:ext uri="{FF2B5EF4-FFF2-40B4-BE49-F238E27FC236}">
-                <a16:creationId xmlns:a16="http://schemas.microsoft.com/office/drawing/2014/main" id="{901C7854-C13A-452E-A6BF-927DD80E98FE}"/>
+                <a16:creationId xmlns:a16="http://schemas.microsoft.com/office/drawing/2014/main" id="{93127488-A85B-4A62-9508-736A0D8854BC}"/>
               </a:ext>
             </a:extLst>
           </p:cNvPr>
@@ -4296,7 +4372,15 @@
           <a:p>
             <a:r>
               <a:rPr lang="de-DE" dirty="0"/>
-              <a:t>Aktueller Stand	</a:t>
+              <a:t>Next </a:t>
+            </a:r>
+            <a:r>
+              <a:rPr lang="de-DE" dirty="0" err="1"/>
+              <a:t>Steps</a:t>
+            </a:r>
+            <a:r>
+              <a:rPr lang="de-DE" dirty="0"/>
+              <a:t> - Backend</a:t>
             </a:r>
           </a:p>
         </p:txBody>
@@ -4306,7 +4390,7 @@
           <p:cNvPr id="3" name="Inhaltsplatzhalter 2">
             <a:extLst>
               <a:ext uri="{FF2B5EF4-FFF2-40B4-BE49-F238E27FC236}">
-                <a16:creationId xmlns:a16="http://schemas.microsoft.com/office/drawing/2014/main" id="{BAC03C0F-1531-4601-A425-EC11A29DDF74}"/>
+                <a16:creationId xmlns:a16="http://schemas.microsoft.com/office/drawing/2014/main" id="{B9323D02-C0D9-4E04-862D-9A22C1BD4674}"/>
               </a:ext>
             </a:extLst>
           </p:cNvPr>
@@ -4324,65 +4408,88 @@
           <a:p>
             <a:r>
               <a:rPr lang="de-DE" dirty="0"/>
-              <a:t>Hardware Recherche</a:t>
+              <a:t>Evaluation</a:t>
             </a:r>
           </a:p>
           <a:p>
             <a:pPr lvl="1"/>
             <a:r>
               <a:rPr lang="de-DE" dirty="0"/>
-              <a:t>Auto: Erledigt, benötigt Freigabe</a:t>
+              <a:t>Web-Framework</a:t>
+            </a:r>
+          </a:p>
+          <a:p>
+            <a:pPr lvl="2"/>
+            <a:r>
+              <a:rPr lang="de-DE" dirty="0"/>
+              <a:t>Vermutlich </a:t>
+            </a:r>
+            <a:r>
+              <a:rPr lang="de-DE" dirty="0" err="1"/>
+              <a:t>Flask</a:t>
+            </a:r>
+            <a:endParaRPr lang="de-DE" dirty="0"/>
+          </a:p>
+          <a:p>
+            <a:pPr lvl="2"/>
+            <a:r>
+              <a:rPr lang="de-DE" dirty="0"/>
+              <a:t>Schnittstelle für Sensordaten</a:t>
+            </a:r>
+          </a:p>
+          <a:p>
+            <a:pPr lvl="2"/>
+            <a:r>
+              <a:rPr lang="de-DE" dirty="0"/>
+              <a:t>Darstellung als Website</a:t>
             </a:r>
           </a:p>
           <a:p>
             <a:pPr lvl="1"/>
             <a:r>
               <a:rPr lang="de-DE" dirty="0"/>
-              <a:t>Backend: Erledigt, bis auf Ventil</a:t>
-            </a:r>
-          </a:p>
-          <a:p>
-            <a:r>
-              <a:rPr lang="de-DE" dirty="0"/>
-              <a:t>Fahrzeuge</a:t>
-            </a:r>
+              <a:t>Darstellung</a:t>
+            </a:r>
+          </a:p>
+          <a:p>
+            <a:pPr lvl="2"/>
+            <a:r>
+              <a:rPr lang="de-DE" dirty="0"/>
+              <a:t>Vermutlich </a:t>
+            </a:r>
+            <a:r>
+              <a:rPr lang="de-DE" dirty="0" err="1"/>
+              <a:t>ChartJS</a:t>
+            </a:r>
+            <a:endParaRPr lang="de-DE" dirty="0"/>
           </a:p>
           <a:p>
             <a:pPr lvl="1"/>
             <a:r>
               <a:rPr lang="de-DE" dirty="0"/>
-              <a:t>Hardware Skizze</a:t>
-            </a:r>
-          </a:p>
-          <a:p>
-            <a:pPr lvl="1"/>
-            <a:r>
-              <a:rPr lang="de-DE" dirty="0"/>
-              <a:t>Konzeptskizze mit Maßen</a:t>
-            </a:r>
-          </a:p>
-          <a:p>
-            <a:r>
-              <a:rPr lang="de-DE" dirty="0"/>
-              <a:t>Erste Schritte 3D Modellierung</a:t>
-            </a:r>
-          </a:p>
-          <a:p>
-            <a:pPr marL="0" indent="0">
-              <a:buNone/>
-            </a:pPr>
-            <a:endParaRPr lang="de-DE" dirty="0"/>
+              <a:t>Hardware</a:t>
+            </a:r>
           </a:p>
           <a:p>
             <a:pPr lvl="2"/>
-            <a:endParaRPr lang="de-DE" dirty="0"/>
+            <a:r>
+              <a:rPr lang="de-DE" dirty="0"/>
+              <a:t>(Optional) Library für LEDs</a:t>
+            </a:r>
+          </a:p>
+          <a:p>
+            <a:pPr lvl="2"/>
+            <a:r>
+              <a:rPr lang="de-DE" dirty="0"/>
+              <a:t>(Optional) Steuerung Pumpe/Ventil für Ballon</a:t>
+            </a:r>
           </a:p>
         </p:txBody>
       </p:sp>
     </p:spTree>
     <p:extLst>
       <p:ext uri="{BB962C8B-B14F-4D97-AF65-F5344CB8AC3E}">
-        <p14:creationId xmlns:p14="http://schemas.microsoft.com/office/powerpoint/2010/main" val="3349344988"/>
+        <p14:creationId xmlns:p14="http://schemas.microsoft.com/office/powerpoint/2010/main" val="836368299"/>
       </p:ext>
     </p:extLst>
   </p:cSld>
@@ -4414,7 +4521,7 @@
           <p:cNvPr id="2" name="Titel 1">
             <a:extLst>
               <a:ext uri="{FF2B5EF4-FFF2-40B4-BE49-F238E27FC236}">
-                <a16:creationId xmlns:a16="http://schemas.microsoft.com/office/drawing/2014/main" id="{93127488-A85B-4A62-9508-736A0D8854BC}"/>
+                <a16:creationId xmlns:a16="http://schemas.microsoft.com/office/drawing/2014/main" id="{802CF7EC-422E-4B46-8C6A-501086E2E433}"/>
               </a:ext>
             </a:extLst>
           </p:cNvPr>
@@ -4440,7 +4547,7 @@
             </a:r>
             <a:r>
               <a:rPr lang="de-DE" dirty="0"/>
-              <a:t> - Backend</a:t>
+              <a:t> – Auto</a:t>
             </a:r>
           </a:p>
         </p:txBody>
@@ -4450,7 +4557,7 @@
           <p:cNvPr id="3" name="Inhaltsplatzhalter 2">
             <a:extLst>
               <a:ext uri="{FF2B5EF4-FFF2-40B4-BE49-F238E27FC236}">
-                <a16:creationId xmlns:a16="http://schemas.microsoft.com/office/drawing/2014/main" id="{B9323D02-C0D9-4E04-862D-9A22C1BD4674}"/>
+                <a16:creationId xmlns:a16="http://schemas.microsoft.com/office/drawing/2014/main" id="{30CC5FFF-9A24-4D8E-A2E6-303ECBE22844}"/>
               </a:ext>
             </a:extLst>
           </p:cNvPr>
@@ -4475,81 +4582,74 @@
             <a:pPr lvl="1"/>
             <a:r>
               <a:rPr lang="de-DE" dirty="0"/>
-              <a:t>Web-Framework</a:t>
+              <a:t>3D Druck für Fahrzeuge</a:t>
             </a:r>
           </a:p>
           <a:p>
             <a:pPr lvl="2"/>
             <a:r>
               <a:rPr lang="de-DE" dirty="0"/>
-              <a:t>Vermutlich </a:t>
-            </a:r>
-            <a:r>
-              <a:rPr lang="de-DE" dirty="0" err="1"/>
-              <a:t>Flask</a:t>
-            </a:r>
+              <a:t>Tools zum Erstellen der Modelle (Blender, …)</a:t>
+            </a:r>
+          </a:p>
+          <a:p>
+            <a:r>
+              <a:rPr lang="de-DE" dirty="0"/>
+              <a:t>Bestellung der Hardware</a:t>
+            </a:r>
+          </a:p>
+          <a:p>
+            <a:r>
+              <a:rPr lang="de-DE" dirty="0"/>
+              <a:t>Elektronik testen</a:t>
+            </a:r>
+          </a:p>
+          <a:p>
+            <a:pPr lvl="1"/>
             <a:endParaRPr lang="de-DE" dirty="0"/>
           </a:p>
-          <a:p>
-            <a:pPr lvl="2"/>
-            <a:r>
-              <a:rPr lang="de-DE" dirty="0"/>
-              <a:t>Schnittstelle für Sensordaten</a:t>
-            </a:r>
-          </a:p>
-          <a:p>
-            <a:pPr lvl="2"/>
-            <a:r>
-              <a:rPr lang="de-DE" dirty="0"/>
-              <a:t>Darstellung als Website</a:t>
-            </a:r>
-          </a:p>
-          <a:p>
-            <a:pPr lvl="1"/>
-            <a:r>
-              <a:rPr lang="de-DE" dirty="0"/>
-              <a:t>Darstellung</a:t>
-            </a:r>
-          </a:p>
-          <a:p>
-            <a:pPr lvl="2"/>
-            <a:r>
-              <a:rPr lang="de-DE" dirty="0"/>
-              <a:t>Vermutlich </a:t>
-            </a:r>
-            <a:r>
-              <a:rPr lang="de-DE" dirty="0" err="1"/>
-              <a:t>ChartJS</a:t>
-            </a:r>
-            <a:endParaRPr lang="de-DE" dirty="0"/>
-          </a:p>
-          <a:p>
-            <a:pPr lvl="1"/>
-            <a:r>
-              <a:rPr lang="de-DE" dirty="0"/>
-              <a:t>Hardware</a:t>
-            </a:r>
-          </a:p>
-          <a:p>
-            <a:pPr lvl="2"/>
-            <a:r>
-              <a:rPr lang="de-DE" dirty="0"/>
-              <a:t>(Optional) Library für LEDs</a:t>
-            </a:r>
-          </a:p>
-          <a:p>
-            <a:pPr lvl="2"/>
-            <a:r>
-              <a:rPr lang="de-DE" dirty="0"/>
-              <a:t>(Optional) Steuerung Pumpe/Ventil für Ballon</a:t>
-            </a:r>
-          </a:p>
-        </p:txBody>
-      </p:sp>
+        </p:txBody>
+      </p:sp>
+      <p:pic>
+        <p:nvPicPr>
+          <p:cNvPr id="5" name="Picture 4">
+            <a:extLst>
+              <a:ext uri="{FF2B5EF4-FFF2-40B4-BE49-F238E27FC236}">
+                <a16:creationId xmlns:a16="http://schemas.microsoft.com/office/drawing/2014/main" id="{816303B6-C025-4768-B034-DEAF7D24F459}"/>
+              </a:ext>
+            </a:extLst>
+          </p:cNvPr>
+          <p:cNvPicPr>
+            <a:picLocks noChangeAspect="1"/>
+          </p:cNvPicPr>
+          <p:nvPr/>
+        </p:nvPicPr>
+        <p:blipFill>
+          <a:blip r:embed="rId2">
+            <a:extLst>
+              <a:ext uri="{28A0092B-C50C-407E-A947-70E740481C1C}">
+                <a14:useLocalDpi xmlns:a14="http://schemas.microsoft.com/office/drawing/2010/main" val="0"/>
+              </a:ext>
+            </a:extLst>
+          </a:blip>
+          <a:stretch>
+            <a:fillRect/>
+          </a:stretch>
+        </p:blipFill>
+        <p:spPr>
+          <a:xfrm>
+            <a:off x="7416367" y="0"/>
+            <a:ext cx="4775633" cy="6858000"/>
+          </a:xfrm>
+          <a:prstGeom prst="rect">
+            <a:avLst/>
+          </a:prstGeom>
+        </p:spPr>
+      </p:pic>
     </p:spTree>
     <p:extLst>
       <p:ext uri="{BB962C8B-B14F-4D97-AF65-F5344CB8AC3E}">
-        <p14:creationId xmlns:p14="http://schemas.microsoft.com/office/powerpoint/2010/main" val="836368299"/>
+        <p14:creationId xmlns:p14="http://schemas.microsoft.com/office/powerpoint/2010/main" val="2460246359"/>
       </p:ext>
     </p:extLst>
   </p:cSld>
@@ -4581,7 +4681,7 @@
           <p:cNvPr id="2" name="Titel 1">
             <a:extLst>
               <a:ext uri="{FF2B5EF4-FFF2-40B4-BE49-F238E27FC236}">
-                <a16:creationId xmlns:a16="http://schemas.microsoft.com/office/drawing/2014/main" id="{802CF7EC-422E-4B46-8C6A-501086E2E433}"/>
+                <a16:creationId xmlns:a16="http://schemas.microsoft.com/office/drawing/2014/main" id="{34A65147-4D6F-4D9E-AA36-D80FC8751F56}"/>
               </a:ext>
             </a:extLst>
           </p:cNvPr>
@@ -4607,7 +4707,7 @@
             </a:r>
             <a:r>
               <a:rPr lang="de-DE" dirty="0"/>
-              <a:t> – Auto</a:t>
+              <a:t> – Allgemein</a:t>
             </a:r>
           </a:p>
         </p:txBody>
@@ -4617,7 +4717,7 @@
           <p:cNvPr id="3" name="Inhaltsplatzhalter 2">
             <a:extLst>
               <a:ext uri="{FF2B5EF4-FFF2-40B4-BE49-F238E27FC236}">
-                <a16:creationId xmlns:a16="http://schemas.microsoft.com/office/drawing/2014/main" id="{30CC5FFF-9A24-4D8E-A2E6-303ECBE22844}"/>
+                <a16:creationId xmlns:a16="http://schemas.microsoft.com/office/drawing/2014/main" id="{E51FDB7C-7C3C-4DA6-A386-67D58ED5A294}"/>
               </a:ext>
             </a:extLst>
           </p:cNvPr>
@@ -4635,37 +4735,57 @@
           <a:p>
             <a:r>
               <a:rPr lang="de-DE" dirty="0"/>
-              <a:t>Evaluation</a:t>
+              <a:t>Untergrund abklären</a:t>
+            </a:r>
+          </a:p>
+          <a:p>
+            <a:r>
+              <a:rPr lang="de-DE" dirty="0"/>
+              <a:t>Möglichkeiten des </a:t>
+            </a:r>
+            <a:r>
+              <a:rPr lang="de-DE" dirty="0" err="1"/>
+              <a:t>FabLab</a:t>
+            </a:r>
+            <a:r>
+              <a:rPr lang="de-DE" dirty="0"/>
+              <a:t> abklären</a:t>
+            </a:r>
+          </a:p>
+          <a:p>
+            <a:r>
+              <a:rPr lang="de-DE" dirty="0"/>
+              <a:t>Hardwarebestellung durchführen</a:t>
+            </a:r>
+          </a:p>
+          <a:p>
+            <a:r>
+              <a:rPr lang="de-DE" dirty="0"/>
+              <a:t>Sonstige Materialien</a:t>
             </a:r>
           </a:p>
           <a:p>
             <a:pPr lvl="1"/>
             <a:r>
-              <a:rPr lang="de-DE" dirty="0"/>
-              <a:t>3D Druck für Fahrzeuge</a:t>
-            </a:r>
-          </a:p>
-          <a:p>
-            <a:pPr lvl="2"/>
-            <a:r>
-              <a:rPr lang="de-DE" dirty="0"/>
-              <a:t>Tools zum Erstellen der Modelle (Blender, …)</a:t>
-            </a:r>
-          </a:p>
-          <a:p>
-            <a:r>
-              <a:rPr lang="de-DE" dirty="0"/>
-              <a:t>Bestellung der Hardware</a:t>
-            </a:r>
-          </a:p>
-          <a:p>
-            <a:r>
-              <a:rPr lang="de-DE" dirty="0"/>
-              <a:t>Elektronik testen</a:t>
-            </a:r>
-          </a:p>
-          <a:p>
-            <a:pPr lvl="1"/>
+              <a:rPr lang="de-DE" dirty="0" err="1"/>
+              <a:t>Breadboard</a:t>
+            </a:r>
+            <a:r>
+              <a:rPr lang="de-DE" dirty="0"/>
+              <a:t>, </a:t>
+            </a:r>
+            <a:r>
+              <a:rPr lang="de-DE" dirty="0" err="1"/>
+              <a:t>JumperWires</a:t>
+            </a:r>
+            <a:r>
+              <a:rPr lang="de-DE" dirty="0"/>
+              <a:t>, </a:t>
+            </a:r>
+            <a:r>
+              <a:rPr lang="de-DE" dirty="0" err="1"/>
+              <a:t>Resistors</a:t>
+            </a:r>
             <a:endParaRPr lang="de-DE" dirty="0"/>
           </a:p>
         </p:txBody>
@@ -4673,7 +4793,7 @@
     </p:spTree>
     <p:extLst>
       <p:ext uri="{BB962C8B-B14F-4D97-AF65-F5344CB8AC3E}">
-        <p14:creationId xmlns:p14="http://schemas.microsoft.com/office/powerpoint/2010/main" val="2460246359"/>
+        <p14:creationId xmlns:p14="http://schemas.microsoft.com/office/powerpoint/2010/main" val="2244558388"/>
       </p:ext>
     </p:extLst>
   </p:cSld>

</xml_diff>